<commit_message>
project report & ppt
</commit_message>
<xml_diff>
--- a/files/g22_pg4_ppt_ET.pptx
+++ b/files/g22_pg4_ppt_ET.pptx
@@ -166,146 +166,6 @@
           <inkml:channelProperty channel="F" name="resolution" value="0" units="1/dev"/>
         </inkml:channelProperties>
       </inkml:inkSource>
-      <inkml:timestamp xml:id="ts0" timeString="2024-10-09T11:13:42.126"/>
-    </inkml:context>
-    <inkml:brush xml:id="br0">
-      <inkml:brushProperty name="width" value="0.35" units="cm"/>
-      <inkml:brushProperty name="height" value="0.35" units="cm"/>
-      <inkml:brushProperty name="color" value="#FFFFFF"/>
-    </inkml:brush>
-  </inkml:definitions>
-  <inkml:trace contextRef="#ctx0" brushRef="#br0">1984 339 24575,'81'-191'0,"-45"115"0,-36 76 0,1 0 0,-1-1 0,0 1 0,1 0 0,-1-1 0,0 1 0,0 0 0,1-1 0,-1 1 0,0 0 0,0-1 0,0 1 0,1 0 0,-1-1 0,0 1 0,0-1 0,0 1 0,0 0 0,0-1 0,0 1 0,0-1 0,0 1 0,0-1 0,0 1 0,0 0 0,0-1 0,0 1 0,0-1 0,0 1 0,-1 0 0,1-1 0,0 1 0,0 0 0,0-1 0,-1 1 0,1 0 0,0-1 0,0 1 0,-1 0 0,1-1 0,0 1 0,-1 0 0,1 0 0,0-1 0,-1 1 0,1 0 0,0 0 0,-1 0 0,1-1 0,-1 1 0,1 0 0,0 0 0,-1 0 0,1 0 0,-1 0 0,1 0 0,0 0 0,-1 0 0,1 0 0,-1 0 0,1 0 0,0 0 0,-1 0 0,1 0 0,-1 1 0,-31 10 0,28-10 0,-83 42 0,-154 100 0,177-102 0,-36 23 0,-425 279 0,502-324 0,23-18 0,0-1 0,0 0 0,0 0 0,0 0 0,0 1 0,1-1 0,-1 0 0,0 0 0,0 1 0,0-1 0,0 0 0,0 0 0,0 0 0,0 1 0,1-1 0,-1 0 0,0 0 0,0 0 0,0 0 0,0 1 0,1-1 0,-1 0 0,0 0 0,0 0 0,0 0 0,1 0 0,-1 0 0,0 0 0,0 0 0,0 0 0,1 0 0,-1 1 0,0-1 0,0 0 0,1 0 0,-1 0 0,0 0 0,0 0 0,1-1 0,-1 1 0,0 0 0,0 0 0,0 0 0,1 0 0,-1 0 0,0 0 0,0 0 0,0 0 0,1 0 0,-1-1 0,56-13 0,490-188 0,-134 44 0,-387 149 0,-14 4 0,0 1 0,1 0 0,-1 1 0,1 0 0,0 1 0,14-1 0,-59 25 0,-294 148 0,312-161 0,14-6 0,29-11 0,15-10 0,-1-1 0,59-37 0,72-61 0,-161 104 0,-12 13 0,0 0 0,0 0 0,0-1 0,-1 1 0,1 0 0,0 0 0,0 0 0,0-1 0,0 1 0,0 0 0,0 0 0,-1 0 0,1-1 0,0 1 0,0 0 0,0 0 0,-1 0 0,1 0 0,0-1 0,0 1 0,0 0 0,-1 0 0,1 0 0,0 0 0,0 0 0,-1 0 0,1 0 0,0 0 0,0 0 0,-1 0 0,1 0 0,0 0 0,0 0 0,-1 0 0,1 0 0,-36 3 0,-51 14 0,-110 38 0,-81 44 0,247-88 0,-342 133 0,539-219 0,173-105 0,-313 162 0,-21 12 0,-19 7 0,-63 22 0,-117 53 0,142-53 0,-215 96 0,6 12 0,-318 213 0,562-333 0,25-15 0,30-20 0,859-512 0,-895 535 0,30-18 0,-23 11 0,-9 7 0,0 1 0,0 0 0,0 0 0,0 0 0,0-1 0,0 1 0,0 0 0,0 0 0,0 0 0,0 0 0,0-1 0,0 1 0,-1 0 0,1 0 0,0 0 0,0 0 0,0 0 0,0 0 0,0-1 0,-1 1 0,1 0 0,0 0 0,0 0 0,0 0 0,0 0 0,-1 0 0,1 0 0,0 0 0,0 0 0,0 0 0,-1 0 0,1 0 0,0 0 0,0 0 0,0 0 0,0 0 0,-1 0 0,1 0 0,0 0 0,0 0 0,0 0 0,-1 0 0,1 0 0,0 0 0,0 0 0,0 0 0,0 0 0,-1 0 0,1 1 0,-43 6 0,0 2 0,0 1 0,-52 21 0,61-19 0,-95 33 0,-236 119 0,347-153 0,18-11 0,0 0 0,0 0 0,0 0 0,1 0 0,-1 0 0,0 0 0,0 0 0,0-1 0,0 1 0,0 0 0,0 0 0,0 0 0,0 0 0,0 0 0,0 0 0,1 1 0,-1-1 0,0 0 0,0 0 0,0 0 0,0 0 0,0 0 0,0 0 0,0 0 0,0 0 0,0 0 0,0 0 0,0 0 0,0 0 0,0 0 0,1 0 0,-1 0 0,0 0 0,0 0 0,0 0 0,0 0 0,0 0 0,0 1 0,0-1 0,0 0 0,0 0 0,0 0 0,0 0 0,0 0 0,0 0 0,0 0 0,0 0 0,0 0 0,0 0 0,0 1 0,0-1 0,0 0 0,0 0 0,0 0 0,38-12 0,469-215 0,-114 46 0,-462 194 0,-314 97 0,837-273 0,-450 161 0,24-10 0,-25 6 0,-17 3 0,-582 10 0,558-6 0,152-32 0,1035-221 0,-1145 250 0,-15 1 0,-25 2 0,33-1 0,-178 11-207,-269 51 0,-168 75-207,-130 48 414,742-183 35,8-2 59,20-1 191,36-7 129,36-7-414,242-32 0,-313 44 0,-35 0 0,-38-1 0,-163 0 0,106 3 0,89-1 0,21-1 0,31-6 0,473-57 0,-497 64 0,-27-2 0,-43-4 0,47 6 0,-105-12 0,-276-40 0,391 53 0,8 0 0,23 0 0,38 3 0,174 27 0,-274-24-1365</inkml:trace>
-</inkml:ink>
-</file>
-
-<file path=ppt/ink/ink2.xml><?xml version="1.0" encoding="utf-8"?>
-<inkml:ink xmlns:inkml="http://www.w3.org/2003/InkML">
-  <inkml:definitions>
-    <inkml:context xml:id="ctx0">
-      <inkml:inkSource xml:id="inkSrc0">
-        <inkml:traceFormat>
-          <inkml:channel name="X" type="integer" min="-2.14748E9" max="2.14748E9" units="cm"/>
-          <inkml:channel name="Y" type="integer" min="-2.14748E9" max="2.14748E9" units="cm"/>
-          <inkml:channel name="F" type="integer" max="32767" units="dev"/>
-        </inkml:traceFormat>
-        <inkml:channelProperties>
-          <inkml:channelProperty channel="X" name="resolution" value="1000" units="1/cm"/>
-          <inkml:channelProperty channel="Y" name="resolution" value="1000" units="1/cm"/>
-          <inkml:channelProperty channel="F" name="resolution" value="0" units="1/dev"/>
-        </inkml:channelProperties>
-      </inkml:inkSource>
-      <inkml:timestamp xml:id="ts0" timeString="2024-10-09T11:14:04.268"/>
-    </inkml:context>
-    <inkml:brush xml:id="br0">
-      <inkml:brushProperty name="width" value="0.35" units="cm"/>
-      <inkml:brushProperty name="height" value="0.35" units="cm"/>
-      <inkml:brushProperty name="color" value="#FFFFFF"/>
-    </inkml:brush>
-  </inkml:definitions>
-  <inkml:trace contextRef="#ctx0" brushRef="#br0">1304 1 24575,'25'25'0,"2"0"0,0-2 0,2 0 0,0-2 0,53 27 0,-78-47 0,1 0 0,-1-1 0,1 1 0,0-1 0,-1 0 0,1-1 0,0 1 0,-1-1 0,1 0 0,-1 0 0,1 0 0,-1 0 0,0-1 0,1 0 0,-1 0 0,0 0 0,0-1 0,0 1 0,-1-1 0,5-4 0,-33 7 0,-45 14 0,23-3 0,0-3 0,-1-1 0,-49-1 0,80-6 0,-109 3 0,109-1 0,1 1 0,-1 0 0,1 1 0,0 1 0,-24 10 0,29-12 0,0 0 0,-1-1 0,1 0 0,-1-1 0,1 0 0,-1-1 0,1 0 0,-16-3 0,-15 1 0,18 2 0,0 0 0,1 2 0,-1 1 0,-35 8 0,-52 11 0,79-13 0,-50 6 0,28-5 0,-22 4 0,51-8 0,0-1 0,0-2 0,0 0 0,0-2 0,-1-1 0,1 0 0,0-2 0,0-1 0,0-2 0,0 0 0,-38-13 0,63 18 0,-1 0 0,1 0 0,-1-1 0,1 1 0,-1 0 0,1 0 0,-1 0 0,1-1 0,-1 1 0,1 0 0,0 0 0,-1-1 0,1 1 0,-1-1 0,1 1 0,0 0 0,-1-1 0,1 1 0,0-1 0,-1 1 0,1-1 0,0 1 0,0-1 0,-1 1 0,1-1 0,0 1 0,0-1 0,0 1 0,0-1 0,0 1 0,0-1 0,0 1 0,0-1 0,11-17 0,26-8 0,-21 16 0,1 1 0,1 1 0,-1 0 0,1 1 0,0 1 0,1 1 0,0 1 0,-1 0 0,1 1 0,34 0 0,191-2-1365</inkml:trace>
-</inkml:ink>
-</file>
-
-<file path=ppt/ink/ink3.xml><?xml version="1.0" encoding="utf-8"?>
-<inkml:ink xmlns:inkml="http://www.w3.org/2003/InkML">
-  <inkml:definitions>
-    <inkml:context xml:id="ctx0">
-      <inkml:inkSource xml:id="inkSrc0">
-        <inkml:traceFormat>
-          <inkml:channel name="X" type="integer" min="-2.14748E9" max="2.14748E9" units="cm"/>
-          <inkml:channel name="Y" type="integer" min="-2.14748E9" max="2.14748E9" units="cm"/>
-          <inkml:channel name="F" type="integer" max="32767" units="dev"/>
-        </inkml:traceFormat>
-        <inkml:channelProperties>
-          <inkml:channelProperty channel="X" name="resolution" value="1000" units="1/cm"/>
-          <inkml:channelProperty channel="Y" name="resolution" value="1000" units="1/cm"/>
-          <inkml:channelProperty channel="F" name="resolution" value="0" units="1/dev"/>
-        </inkml:channelProperties>
-      </inkml:inkSource>
-      <inkml:timestamp xml:id="ts0" timeString="2024-10-09T11:14:06.844"/>
-    </inkml:context>
-    <inkml:brush xml:id="br0">
-      <inkml:brushProperty name="width" value="0.35" units="cm"/>
-      <inkml:brushProperty name="height" value="0.35" units="cm"/>
-      <inkml:brushProperty name="color" value="#FFFFFF"/>
-    </inkml:brush>
-  </inkml:definitions>
-  <inkml:trace contextRef="#ctx0" brushRef="#br0">102 1 24575,'10'1'0,"0"1"0,0 0 0,0 1 0,0 0 0,0 0 0,13 8 0,10 2 0,-3-2 0,-7-2 0,0-1 0,1 0 0,0-2 0,1-1 0,-1-1 0,50 2 0,-110-4 0,-111 8 0,129-6 0,-1 0 0,1 0 0,0 2 0,0 0 0,1 1 0,-17 10 0,20-9 0,1-1 0,-1-1 0,-1 0 0,1-1 0,-1 0 0,0-1 0,-25 3 0</inkml:trace>
-</inkml:ink>
-</file>
-
-<file path=ppt/ink/ink4.xml><?xml version="1.0" encoding="utf-8"?>
-<inkml:ink xmlns:inkml="http://www.w3.org/2003/InkML">
-  <inkml:definitions>
-    <inkml:context xml:id="ctx0">
-      <inkml:inkSource xml:id="inkSrc0">
-        <inkml:traceFormat>
-          <inkml:channel name="X" type="integer" min="-2.14748E9" max="2.14748E9" units="cm"/>
-          <inkml:channel name="Y" type="integer" min="-2.14748E9" max="2.14748E9" units="cm"/>
-          <inkml:channel name="F" type="integer" max="32767" units="dev"/>
-        </inkml:traceFormat>
-        <inkml:channelProperties>
-          <inkml:channelProperty channel="X" name="resolution" value="1000" units="1/cm"/>
-          <inkml:channelProperty channel="Y" name="resolution" value="1000" units="1/cm"/>
-          <inkml:channelProperty channel="F" name="resolution" value="0" units="1/dev"/>
-        </inkml:channelProperties>
-      </inkml:inkSource>
-      <inkml:timestamp xml:id="ts0" timeString="2024-10-09T11:14:10.872"/>
-    </inkml:context>
-    <inkml:brush xml:id="br0">
-      <inkml:brushProperty name="width" value="0.35" units="cm"/>
-      <inkml:brushProperty name="height" value="0.35" units="cm"/>
-      <inkml:brushProperty name="color" value="#FFFFFF"/>
-    </inkml:brush>
-  </inkml:definitions>
-  <inkml:trace contextRef="#ctx0" brushRef="#br0">0 11 24575,'10'-3'0,"-1"1"0,1 0 0,-1 1 0,1 0 0,-1 0 0,1 1 0,0 0 0,0 1 0,-1 0 0,1 1 0,-1 0 0,1 0 0,14 6 0,9 6 0,0 1 0,41 27 0,-31-17 0,118 59 0,204 76 0,-291-126 0,-57-25 0,1 0 0,0-1 0,0-1 0,1-1 0,25 5 0,53 3 0,0-5 0,111-3 0,-140-8 0,-1-4 0,0-3 0,130-34 0,123-37 0,-266 68 0,15 0 0,0 3 0,82-1 0,-67 6 0,47-7 0,76-2 0,-290 55 0,35-13 251,21-12-1059,-44 19 0</inkml:trace>
-</inkml:ink>
-</file>
-
-<file path=ppt/ink/ink5.xml><?xml version="1.0" encoding="utf-8"?>
-<inkml:ink xmlns:inkml="http://www.w3.org/2003/InkML">
-  <inkml:definitions>
-    <inkml:context xml:id="ctx0">
-      <inkml:inkSource xml:id="inkSrc0">
-        <inkml:traceFormat>
-          <inkml:channel name="X" type="integer" min="-2.14748E9" max="2.14748E9" units="cm"/>
-          <inkml:channel name="Y" type="integer" min="-2.14748E9" max="2.14748E9" units="cm"/>
-          <inkml:channel name="F" type="integer" max="32767" units="dev"/>
-        </inkml:traceFormat>
-        <inkml:channelProperties>
-          <inkml:channelProperty channel="X" name="resolution" value="1000" units="1/cm"/>
-          <inkml:channelProperty channel="Y" name="resolution" value="1000" units="1/cm"/>
-          <inkml:channelProperty channel="F" name="resolution" value="0" units="1/dev"/>
-        </inkml:channelProperties>
-      </inkml:inkSource>
-      <inkml:timestamp xml:id="ts0" timeString="2024-10-09T11:16:51.772"/>
-    </inkml:context>
-    <inkml:brush xml:id="br0">
-      <inkml:brushProperty name="width" value="0.35" units="cm"/>
-      <inkml:brushProperty name="height" value="0.35" units="cm"/>
-      <inkml:brushProperty name="color" value="#FFFFFF"/>
-    </inkml:brush>
-  </inkml:definitions>
-  <inkml:trace contextRef="#ctx0" brushRef="#br0">0 0 24575,'0'0'-8191</inkml:trace>
-</inkml:ink>
-</file>
-
-<file path=ppt/ink/ink6.xml><?xml version="1.0" encoding="utf-8"?>
-<inkml:ink xmlns:inkml="http://www.w3.org/2003/InkML">
-  <inkml:definitions>
-    <inkml:context xml:id="ctx0">
-      <inkml:inkSource xml:id="inkSrc0">
-        <inkml:traceFormat>
-          <inkml:channel name="X" type="integer" min="-2.14748E9" max="2.14748E9" units="cm"/>
-          <inkml:channel name="Y" type="integer" min="-2.14748E9" max="2.14748E9" units="cm"/>
-          <inkml:channel name="F" type="integer" max="32767" units="dev"/>
-        </inkml:traceFormat>
-        <inkml:channelProperties>
-          <inkml:channelProperty channel="X" name="resolution" value="1000" units="1/cm"/>
-          <inkml:channelProperty channel="Y" name="resolution" value="1000" units="1/cm"/>
-          <inkml:channelProperty channel="F" name="resolution" value="0" units="1/dev"/>
-        </inkml:channelProperties>
-      </inkml:inkSource>
       <inkml:timestamp xml:id="ts0" timeString="2024-10-09T11:16:54.197"/>
     </inkml:context>
     <inkml:brush xml:id="br0">
@@ -318,7 +178,7 @@
 </inkml:ink>
 </file>
 
-<file path=ppt/ink/ink7.xml><?xml version="1.0" encoding="utf-8"?>
+<file path=ppt/ink/ink2.xml><?xml version="1.0" encoding="utf-8"?>
 <inkml:ink xmlns:inkml="http://www.w3.org/2003/InkML">
   <inkml:definitions>
     <inkml:context xml:id="ctx0">
@@ -346,7 +206,7 @@
 </inkml:ink>
 </file>
 
-<file path=ppt/ink/ink8.xml><?xml version="1.0" encoding="utf-8"?>
+<file path=ppt/ink/ink3.xml><?xml version="1.0" encoding="utf-8"?>
 <inkml:ink xmlns:inkml="http://www.w3.org/2003/InkML">
   <inkml:definitions>
     <inkml:context xml:id="ctx0">
@@ -554,7 +414,7 @@
             <a:fld id="{1D8BD707-D9CF-40AE-B4C6-C98DA3205C09}" type="datetimeFigureOut">
               <a:rPr lang="en-US" smtClean="0"/>
               <a:pPr/>
-              <a:t>10/9/2024</a:t>
+              <a:t>12/9/2024</a:t>
             </a:fld>
             <a:endParaRPr lang="en-US"/>
           </a:p>
@@ -719,7 +579,7 @@
             <a:fld id="{1D8BD707-D9CF-40AE-B4C6-C98DA3205C09}" type="datetimeFigureOut">
               <a:rPr lang="en-US" smtClean="0"/>
               <a:pPr/>
-              <a:t>10/9/2024</a:t>
+              <a:t>12/9/2024</a:t>
             </a:fld>
             <a:endParaRPr lang="en-US"/>
           </a:p>
@@ -894,7 +754,7 @@
             <a:fld id="{1D8BD707-D9CF-40AE-B4C6-C98DA3205C09}" type="datetimeFigureOut">
               <a:rPr lang="en-US" smtClean="0"/>
               <a:pPr/>
-              <a:t>10/9/2024</a:t>
+              <a:t>12/9/2024</a:t>
             </a:fld>
             <a:endParaRPr lang="en-US"/>
           </a:p>
@@ -1059,7 +919,7 @@
             <a:fld id="{1D8BD707-D9CF-40AE-B4C6-C98DA3205C09}" type="datetimeFigureOut">
               <a:rPr lang="en-US" smtClean="0"/>
               <a:pPr/>
-              <a:t>10/9/2024</a:t>
+              <a:t>12/9/2024</a:t>
             </a:fld>
             <a:endParaRPr lang="en-US"/>
           </a:p>
@@ -1301,7 +1161,7 @@
             <a:fld id="{1D8BD707-D9CF-40AE-B4C6-C98DA3205C09}" type="datetimeFigureOut">
               <a:rPr lang="en-US" smtClean="0"/>
               <a:pPr/>
-              <a:t>10/9/2024</a:t>
+              <a:t>12/9/2024</a:t>
             </a:fld>
             <a:endParaRPr lang="en-US"/>
           </a:p>
@@ -1583,7 +1443,7 @@
             <a:fld id="{1D8BD707-D9CF-40AE-B4C6-C98DA3205C09}" type="datetimeFigureOut">
               <a:rPr lang="en-US" smtClean="0"/>
               <a:pPr/>
-              <a:t>10/9/2024</a:t>
+              <a:t>12/9/2024</a:t>
             </a:fld>
             <a:endParaRPr lang="en-US"/>
           </a:p>
@@ -1999,7 +1859,7 @@
             <a:fld id="{1D8BD707-D9CF-40AE-B4C6-C98DA3205C09}" type="datetimeFigureOut">
               <a:rPr lang="en-US" smtClean="0"/>
               <a:pPr/>
-              <a:t>10/9/2024</a:t>
+              <a:t>12/9/2024</a:t>
             </a:fld>
             <a:endParaRPr lang="en-US"/>
           </a:p>
@@ -2113,7 +1973,7 @@
             <a:fld id="{1D8BD707-D9CF-40AE-B4C6-C98DA3205C09}" type="datetimeFigureOut">
               <a:rPr lang="en-US" smtClean="0"/>
               <a:pPr/>
-              <a:t>10/9/2024</a:t>
+              <a:t>12/9/2024</a:t>
             </a:fld>
             <a:endParaRPr lang="en-US"/>
           </a:p>
@@ -2205,7 +2065,7 @@
             <a:fld id="{1D8BD707-D9CF-40AE-B4C6-C98DA3205C09}" type="datetimeFigureOut">
               <a:rPr lang="en-US" smtClean="0"/>
               <a:pPr/>
-              <a:t>10/9/2024</a:t>
+              <a:t>12/9/2024</a:t>
             </a:fld>
             <a:endParaRPr lang="en-US"/>
           </a:p>
@@ -2477,7 +2337,7 @@
             <a:fld id="{1D8BD707-D9CF-40AE-B4C6-C98DA3205C09}" type="datetimeFigureOut">
               <a:rPr lang="en-US" smtClean="0"/>
               <a:pPr/>
-              <a:t>10/9/2024</a:t>
+              <a:t>12/9/2024</a:t>
             </a:fld>
             <a:endParaRPr lang="en-US"/>
           </a:p>
@@ -2726,7 +2586,7 @@
             <a:fld id="{1D8BD707-D9CF-40AE-B4C6-C98DA3205C09}" type="datetimeFigureOut">
               <a:rPr lang="en-US" smtClean="0"/>
               <a:pPr/>
-              <a:t>10/9/2024</a:t>
+              <a:t>12/9/2024</a:t>
             </a:fld>
             <a:endParaRPr lang="en-US"/>
           </a:p>
@@ -2934,7 +2794,7 @@
             <a:fld id="{1D8BD707-D9CF-40AE-B4C6-C98DA3205C09}" type="datetimeFigureOut">
               <a:rPr lang="en-US" smtClean="0"/>
               <a:pPr/>
-              <a:t>10/9/2024</a:t>
+              <a:t>12/9/2024</a:t>
             </a:fld>
             <a:endParaRPr lang="en-US"/>
           </a:p>
@@ -3305,388 +3165,9 @@
           <a:chExt cx="0" cy="0"/>
         </a:xfrm>
       </p:grpSpPr>
-      <p:grpSp>
-        <p:nvGrpSpPr>
-          <p:cNvPr id="2" name="Group 2"/>
-          <p:cNvGrpSpPr/>
-          <p:nvPr/>
-        </p:nvGrpSpPr>
-        <p:grpSpPr>
-          <a:xfrm>
-            <a:off x="5181600" y="0"/>
-            <a:ext cx="8186506" cy="10287000"/>
-            <a:chOff x="0" y="0"/>
-            <a:chExt cx="10692779" cy="13896475"/>
-          </a:xfrm>
-        </p:grpSpPr>
-        <p:sp>
-          <p:nvSpPr>
-            <p:cNvPr id="3" name="Freeform 3"/>
-            <p:cNvSpPr/>
-            <p:nvPr/>
-          </p:nvSpPr>
-          <p:spPr>
-            <a:xfrm>
-              <a:off x="0" y="0"/>
-              <a:ext cx="10692765" cy="13896467"/>
-            </a:xfrm>
-            <a:custGeom>
-              <a:avLst/>
-              <a:gdLst/>
-              <a:ahLst/>
-              <a:cxnLst/>
-              <a:rect l="l" t="t" r="r" b="b"/>
-              <a:pathLst>
-                <a:path w="10692765" h="13896467">
-                  <a:moveTo>
-                    <a:pt x="0" y="0"/>
-                  </a:moveTo>
-                  <a:lnTo>
-                    <a:pt x="10692765" y="0"/>
-                  </a:lnTo>
-                  <a:lnTo>
-                    <a:pt x="10692765" y="13896467"/>
-                  </a:lnTo>
-                  <a:lnTo>
-                    <a:pt x="0" y="13896467"/>
-                  </a:lnTo>
-                  <a:lnTo>
-                    <a:pt x="0" y="0"/>
-                  </a:lnTo>
-                  <a:close/>
-                </a:path>
-              </a:pathLst>
-            </a:custGeom>
-            <a:blipFill>
-              <a:blip r:embed="rId2"/>
-              <a:stretch>
-                <a:fillRect l="-800" r="-800"/>
-              </a:stretch>
-            </a:blipFill>
-          </p:spPr>
-          <p:txBody>
-            <a:bodyPr/>
-            <a:lstStyle/>
-            <a:p>
-              <a:endParaRPr lang="en-IN" dirty="0"/>
-            </a:p>
-          </p:txBody>
-        </p:sp>
-      </p:grpSp>
-      <mc:AlternateContent xmlns:mc="http://schemas.openxmlformats.org/markup-compatibility/2006">
-        <mc:Choice xmlns:p14="http://schemas.microsoft.com/office/powerpoint/2010/main" Requires="p14">
-          <p:contentPart p14:bwMode="auto" r:id="rId3">
-            <p14:nvContentPartPr>
-              <p14:cNvPr id="4" name="Ink 3">
-                <a:extLst>
-                  <a:ext uri="{FF2B5EF4-FFF2-40B4-BE49-F238E27FC236}">
-                    <a16:creationId xmlns:a16="http://schemas.microsoft.com/office/drawing/2014/main" id="{21744283-E954-E751-74A6-9AF678A7ABBD}"/>
-                  </a:ext>
-                </a:extLst>
-              </p14:cNvPr>
-              <p14:cNvContentPartPr/>
-              <p14:nvPr/>
-            </p14:nvContentPartPr>
-            <p14:xfrm>
-              <a:off x="6911655" y="6141540"/>
-              <a:ext cx="785520" cy="383760"/>
-            </p14:xfrm>
-          </p:contentPart>
-        </mc:Choice>
-        <mc:Fallback>
-          <p:pic>
-            <p:nvPicPr>
-              <p:cNvPr id="4" name="Ink 3">
-                <a:extLst>
-                  <a:ext uri="{FF2B5EF4-FFF2-40B4-BE49-F238E27FC236}">
-                    <a16:creationId xmlns:a16="http://schemas.microsoft.com/office/drawing/2014/main" id="{21744283-E954-E751-74A6-9AF678A7ABBD}"/>
-                  </a:ext>
-                </a:extLst>
-              </p:cNvPr>
-              <p:cNvPicPr/>
-              <p:nvPr/>
-            </p:nvPicPr>
-            <p:blipFill>
-              <a:blip r:embed="rId4"/>
-              <a:stretch>
-                <a:fillRect/>
-              </a:stretch>
-            </p:blipFill>
-            <p:spPr>
-              <a:xfrm>
-                <a:off x="6849015" y="6078540"/>
-                <a:ext cx="911160" cy="509400"/>
-              </a:xfrm>
-              <a:prstGeom prst="rect">
-                <a:avLst/>
-              </a:prstGeom>
-            </p:spPr>
-          </p:pic>
-        </mc:Fallback>
-      </mc:AlternateContent>
-      <p:grpSp>
-        <p:nvGrpSpPr>
-          <p:cNvPr id="9" name="Group 8">
-            <a:extLst>
-              <a:ext uri="{FF2B5EF4-FFF2-40B4-BE49-F238E27FC236}">
-                <a16:creationId xmlns:a16="http://schemas.microsoft.com/office/drawing/2014/main" id="{B590F2E6-2039-2D10-7D8C-CF8EC21DA1F8}"/>
-              </a:ext>
-            </a:extLst>
-          </p:cNvPr>
-          <p:cNvGrpSpPr/>
-          <p:nvPr/>
-        </p:nvGrpSpPr>
-        <p:grpSpPr>
-          <a:xfrm>
-            <a:off x="6057465" y="6124620"/>
-            <a:ext cx="1181520" cy="169560"/>
-            <a:chOff x="6057465" y="6124620"/>
-            <a:chExt cx="1181520" cy="169560"/>
-          </a:xfrm>
-        </p:grpSpPr>
-        <mc:AlternateContent xmlns:mc="http://schemas.openxmlformats.org/markup-compatibility/2006">
-          <mc:Choice xmlns:p14="http://schemas.microsoft.com/office/powerpoint/2010/main" Requires="p14">
-            <p:contentPart p14:bwMode="auto" r:id="rId5">
-              <p14:nvContentPartPr>
-                <p14:cNvPr id="5" name="Ink 4">
-                  <a:extLst>
-                    <a:ext uri="{FF2B5EF4-FFF2-40B4-BE49-F238E27FC236}">
-                      <a16:creationId xmlns:a16="http://schemas.microsoft.com/office/drawing/2014/main" id="{3B550D95-E407-5FE1-DACB-30E2CE5529AA}"/>
-                    </a:ext>
-                  </a:extLst>
-                </p14:cNvPr>
-                <p14:cNvContentPartPr/>
-                <p14:nvPr/>
-              </p14:nvContentPartPr>
-              <p14:xfrm>
-                <a:off x="6282015" y="6141540"/>
-                <a:ext cx="582840" cy="119880"/>
-              </p14:xfrm>
-            </p:contentPart>
-          </mc:Choice>
-          <mc:Fallback>
-            <p:pic>
-              <p:nvPicPr>
-                <p:cNvPr id="5" name="Ink 4">
-                  <a:extLst>
-                    <a:ext uri="{FF2B5EF4-FFF2-40B4-BE49-F238E27FC236}">
-                      <a16:creationId xmlns:a16="http://schemas.microsoft.com/office/drawing/2014/main" id="{3B550D95-E407-5FE1-DACB-30E2CE5529AA}"/>
-                    </a:ext>
-                  </a:extLst>
-                </p:cNvPr>
-                <p:cNvPicPr/>
-                <p:nvPr/>
-              </p:nvPicPr>
-              <p:blipFill>
-                <a:blip r:embed="rId6"/>
-                <a:stretch>
-                  <a:fillRect/>
-                </a:stretch>
-              </p:blipFill>
-              <p:spPr>
-                <a:xfrm>
-                  <a:off x="6219375" y="6078900"/>
-                  <a:ext cx="708480" cy="245520"/>
-                </a:xfrm>
-                <a:prstGeom prst="rect">
-                  <a:avLst/>
-                </a:prstGeom>
-              </p:spPr>
-            </p:pic>
-          </mc:Fallback>
-        </mc:AlternateContent>
-        <mc:AlternateContent xmlns:mc="http://schemas.openxmlformats.org/markup-compatibility/2006">
-          <mc:Choice xmlns:p14="http://schemas.microsoft.com/office/powerpoint/2010/main" Requires="p14">
-            <p:contentPart p14:bwMode="auto" r:id="rId7">
-              <p14:nvContentPartPr>
-                <p14:cNvPr id="6" name="Ink 5">
-                  <a:extLst>
-                    <a:ext uri="{FF2B5EF4-FFF2-40B4-BE49-F238E27FC236}">
-                      <a16:creationId xmlns:a16="http://schemas.microsoft.com/office/drawing/2014/main" id="{0210F896-F832-CEB4-E0DF-19512D0AC520}"/>
-                    </a:ext>
-                  </a:extLst>
-                </p14:cNvPr>
-                <p14:cNvContentPartPr/>
-                <p14:nvPr/>
-              </p14:nvContentPartPr>
-              <p14:xfrm>
-                <a:off x="6057465" y="6169980"/>
-                <a:ext cx="167400" cy="73440"/>
-              </p14:xfrm>
-            </p:contentPart>
-          </mc:Choice>
-          <mc:Fallback>
-            <p:pic>
-              <p:nvPicPr>
-                <p:cNvPr id="6" name="Ink 5">
-                  <a:extLst>
-                    <a:ext uri="{FF2B5EF4-FFF2-40B4-BE49-F238E27FC236}">
-                      <a16:creationId xmlns:a16="http://schemas.microsoft.com/office/drawing/2014/main" id="{0210F896-F832-CEB4-E0DF-19512D0AC520}"/>
-                    </a:ext>
-                  </a:extLst>
-                </p:cNvPr>
-                <p:cNvPicPr/>
-                <p:nvPr/>
-              </p:nvPicPr>
-              <p:blipFill>
-                <a:blip r:embed="rId8"/>
-                <a:stretch>
-                  <a:fillRect/>
-                </a:stretch>
-              </p:blipFill>
-              <p:spPr>
-                <a:xfrm>
-                  <a:off x="5994465" y="6107340"/>
-                  <a:ext cx="293040" cy="199080"/>
-                </a:xfrm>
-                <a:prstGeom prst="rect">
-                  <a:avLst/>
-                </a:prstGeom>
-              </p:spPr>
-            </p:pic>
-          </mc:Fallback>
-        </mc:AlternateContent>
-        <mc:AlternateContent xmlns:mc="http://schemas.openxmlformats.org/markup-compatibility/2006">
-          <mc:Choice xmlns:p14="http://schemas.microsoft.com/office/powerpoint/2010/main" Requires="p14">
-            <p:contentPart p14:bwMode="auto" r:id="rId9">
-              <p14:nvContentPartPr>
-                <p14:cNvPr id="8" name="Ink 7">
-                  <a:extLst>
-                    <a:ext uri="{FF2B5EF4-FFF2-40B4-BE49-F238E27FC236}">
-                      <a16:creationId xmlns:a16="http://schemas.microsoft.com/office/drawing/2014/main" id="{A9DD7F08-B7AB-FCD2-9181-E47D2CD46781}"/>
-                    </a:ext>
-                  </a:extLst>
-                </p14:cNvPr>
-                <p14:cNvContentPartPr/>
-                <p14:nvPr/>
-              </p14:nvContentPartPr>
-              <p14:xfrm>
-                <a:off x="6175905" y="6124620"/>
-                <a:ext cx="1063080" cy="169560"/>
-              </p14:xfrm>
-            </p:contentPart>
-          </mc:Choice>
-          <mc:Fallback>
-            <p:pic>
-              <p:nvPicPr>
-                <p:cNvPr id="8" name="Ink 7">
-                  <a:extLst>
-                    <a:ext uri="{FF2B5EF4-FFF2-40B4-BE49-F238E27FC236}">
-                      <a16:creationId xmlns:a16="http://schemas.microsoft.com/office/drawing/2014/main" id="{A9DD7F08-B7AB-FCD2-9181-E47D2CD46781}"/>
-                    </a:ext>
-                  </a:extLst>
-                </p:cNvPr>
-                <p:cNvPicPr/>
-                <p:nvPr/>
-              </p:nvPicPr>
-              <p:blipFill>
-                <a:blip r:embed="rId10"/>
-                <a:stretch>
-                  <a:fillRect/>
-                </a:stretch>
-              </p:blipFill>
-              <p:spPr>
-                <a:xfrm>
-                  <a:off x="6112905" y="6061980"/>
-                  <a:ext cx="1188720" cy="295200"/>
-                </a:xfrm>
-                <a:prstGeom prst="rect">
-                  <a:avLst/>
-                </a:prstGeom>
-              </p:spPr>
-            </p:pic>
-          </mc:Fallback>
-        </mc:AlternateContent>
-      </p:grpSp>
-      <p:sp>
-        <p:nvSpPr>
-          <p:cNvPr id="10" name="TextBox 9">
-            <a:extLst>
-              <a:ext uri="{FF2B5EF4-FFF2-40B4-BE49-F238E27FC236}">
-                <a16:creationId xmlns:a16="http://schemas.microsoft.com/office/drawing/2014/main" id="{5AFC3CFD-659B-1BC3-D08F-B342B5E80C56}"/>
-              </a:ext>
-            </a:extLst>
-          </p:cNvPr>
-          <p:cNvSpPr txBox="1"/>
-          <p:nvPr/>
-        </p:nvSpPr>
-        <p:spPr>
-          <a:xfrm>
-            <a:off x="5967952" y="6025643"/>
-            <a:ext cx="1977095" cy="307777"/>
-          </a:xfrm>
-          <a:prstGeom prst="rect">
-            <a:avLst/>
-          </a:prstGeom>
-          <a:noFill/>
-        </p:spPr>
-        <p:txBody>
-          <a:bodyPr wrap="square" rtlCol="0">
-            <a:spAutoFit/>
-          </a:bodyPr>
-          <a:lstStyle/>
-          <a:p>
-            <a:r>
-              <a:rPr lang="en-IN" sz="1400" dirty="0"/>
-              <a:t>Mrs. Harpreet Kaur</a:t>
-            </a:r>
-          </a:p>
-        </p:txBody>
-      </p:sp>
-      <mc:AlternateContent xmlns:mc="http://schemas.openxmlformats.org/markup-compatibility/2006">
-        <mc:Choice xmlns:p14="http://schemas.microsoft.com/office/powerpoint/2010/main" Requires="p14">
-          <p:contentPart p14:bwMode="auto" r:id="rId11">
-            <p14:nvContentPartPr>
-              <p14:cNvPr id="11" name="Ink 10">
-                <a:extLst>
-                  <a:ext uri="{FF2B5EF4-FFF2-40B4-BE49-F238E27FC236}">
-                    <a16:creationId xmlns:a16="http://schemas.microsoft.com/office/drawing/2014/main" id="{2D17F26D-CC09-B1C6-4C64-1314D304DE77}"/>
-                  </a:ext>
-                </a:extLst>
-              </p14:cNvPr>
-              <p14:cNvContentPartPr/>
-              <p14:nvPr/>
-            </p14:nvContentPartPr>
-            <p14:xfrm>
-              <a:off x="8820165" y="2707020"/>
-              <a:ext cx="360" cy="360"/>
-            </p14:xfrm>
-          </p:contentPart>
-        </mc:Choice>
-        <mc:Fallback>
-          <p:pic>
-            <p:nvPicPr>
-              <p:cNvPr id="11" name="Ink 10">
-                <a:extLst>
-                  <a:ext uri="{FF2B5EF4-FFF2-40B4-BE49-F238E27FC236}">
-                    <a16:creationId xmlns:a16="http://schemas.microsoft.com/office/drawing/2014/main" id="{2D17F26D-CC09-B1C6-4C64-1314D304DE77}"/>
-                  </a:ext>
-                </a:extLst>
-              </p:cNvPr>
-              <p:cNvPicPr/>
-              <p:nvPr/>
-            </p:nvPicPr>
-            <p:blipFill>
-              <a:blip r:embed="rId12"/>
-              <a:stretch>
-                <a:fillRect/>
-              </a:stretch>
-            </p:blipFill>
-            <p:spPr>
-              <a:xfrm>
-                <a:off x="8757165" y="2644020"/>
-                <a:ext cx="126000" cy="126000"/>
-              </a:xfrm>
-              <a:prstGeom prst="rect">
-                <a:avLst/>
-              </a:prstGeom>
-            </p:spPr>
-          </p:pic>
-        </mc:Fallback>
-      </mc:AlternateContent>
-      <mc:AlternateContent xmlns:mc="http://schemas.openxmlformats.org/markup-compatibility/2006">
-        <mc:Choice xmlns:p14="http://schemas.microsoft.com/office/powerpoint/2010/main" Requires="p14">
-          <p:contentPart p14:bwMode="auto" r:id="rId13">
+      <mc:AlternateContent xmlns:mc="http://schemas.openxmlformats.org/markup-compatibility/2006" xmlns:p14="http://schemas.microsoft.com/office/powerpoint/2010/main">
+        <mc:Choice Requires="p14">
+          <p:contentPart p14:bwMode="auto" r:id="rId2">
             <p14:nvContentPartPr>
               <p14:cNvPr id="12" name="Ink 11">
                 <a:extLst>
@@ -3704,7 +3185,7 @@
             </p14:xfrm>
           </p:contentPart>
         </mc:Choice>
-        <mc:Fallback>
+        <mc:Fallback xmlns="">
           <p:pic>
             <p:nvPicPr>
               <p:cNvPr id="12" name="Ink 11">
@@ -3735,6 +3216,36 @@
           </p:pic>
         </mc:Fallback>
       </mc:AlternateContent>
+      <p:pic>
+        <p:nvPicPr>
+          <p:cNvPr id="14" name="Picture 13">
+            <a:extLst>
+              <a:ext uri="{FF2B5EF4-FFF2-40B4-BE49-F238E27FC236}">
+                <a16:creationId xmlns:a16="http://schemas.microsoft.com/office/drawing/2014/main" id="{DCB6E838-2D5A-E666-CEAC-EEC6362AF046}"/>
+              </a:ext>
+            </a:extLst>
+          </p:cNvPr>
+          <p:cNvPicPr>
+            <a:picLocks noChangeAspect="1"/>
+          </p:cNvPicPr>
+          <p:nvPr/>
+        </p:nvPicPr>
+        <p:blipFill>
+          <a:blip r:embed="rId13"/>
+          <a:stretch>
+            <a:fillRect/>
+          </a:stretch>
+        </p:blipFill>
+        <p:spPr>
+          <a:xfrm>
+            <a:off x="5486400" y="65891"/>
+            <a:ext cx="7315199" cy="10155217"/>
+          </a:xfrm>
+          <a:prstGeom prst="rect">
+            <a:avLst/>
+          </a:prstGeom>
+        </p:spPr>
+      </p:pic>
     </p:spTree>
   </p:cSld>
   <p:clrMapOvr>
@@ -3819,6 +3330,13 @@
               </a:stretch>
             </a:blipFill>
           </p:spPr>
+          <p:txBody>
+            <a:bodyPr/>
+            <a:lstStyle/>
+            <a:p>
+              <a:endParaRPr lang="en-US"/>
+            </a:p>
+          </p:txBody>
         </p:sp>
       </p:grpSp>
       <p:grpSp>
@@ -3880,6 +3398,13 @@
               </a:stretch>
             </a:blipFill>
           </p:spPr>
+          <p:txBody>
+            <a:bodyPr/>
+            <a:lstStyle/>
+            <a:p>
+              <a:endParaRPr lang="en-US"/>
+            </a:p>
+          </p:txBody>
         </p:sp>
       </p:grpSp>
       <p:sp>
@@ -3933,6 +3458,13 @@
             </a:stretch>
           </a:blipFill>
         </p:spPr>
+        <p:txBody>
+          <a:bodyPr/>
+          <a:lstStyle/>
+          <a:p>
+            <a:endParaRPr lang="en-US"/>
+          </a:p>
+        </p:txBody>
       </p:sp>
       <p:grpSp>
         <p:nvGrpSpPr>
@@ -4013,6 +3545,13 @@
               </a:stretch>
             </a:blipFill>
           </p:spPr>
+          <p:txBody>
+            <a:bodyPr/>
+            <a:lstStyle/>
+            <a:p>
+              <a:endParaRPr lang="en-US"/>
+            </a:p>
+          </p:txBody>
         </p:sp>
       </p:grpSp>
       <p:sp>
@@ -4132,6 +3671,13 @@
             </a:stretch>
           </a:blipFill>
         </p:spPr>
+        <p:txBody>
+          <a:bodyPr/>
+          <a:lstStyle/>
+          <a:p>
+            <a:endParaRPr lang="en-US"/>
+          </a:p>
+        </p:txBody>
       </p:sp>
       <p:grpSp>
         <p:nvGrpSpPr>
@@ -4212,6 +3758,13 @@
               </a:stretch>
             </a:blipFill>
           </p:spPr>
+          <p:txBody>
+            <a:bodyPr/>
+            <a:lstStyle/>
+            <a:p>
+              <a:endParaRPr lang="en-US"/>
+            </a:p>
+          </p:txBody>
         </p:sp>
       </p:grpSp>
       <p:sp>
@@ -4334,6 +3887,13 @@
               </a:stretch>
             </a:blipFill>
           </p:spPr>
+          <p:txBody>
+            <a:bodyPr/>
+            <a:lstStyle/>
+            <a:p>
+              <a:endParaRPr lang="en-US"/>
+            </a:p>
+          </p:txBody>
         </p:sp>
       </p:grpSp>
       <p:sp>
@@ -4387,6 +3947,13 @@
             </a:stretch>
           </a:blipFill>
         </p:spPr>
+        <p:txBody>
+          <a:bodyPr/>
+          <a:lstStyle/>
+          <a:p>
+            <a:endParaRPr lang="en-US"/>
+          </a:p>
+        </p:txBody>
       </p:sp>
       <p:sp>
         <p:nvSpPr>
@@ -4505,6 +4072,13 @@
             </a:stretch>
           </a:blipFill>
         </p:spPr>
+        <p:txBody>
+          <a:bodyPr/>
+          <a:lstStyle/>
+          <a:p>
+            <a:endParaRPr lang="en-US"/>
+          </a:p>
+        </p:txBody>
       </p:sp>
       <p:grpSp>
         <p:nvGrpSpPr>
@@ -4585,6 +4159,13 @@
               </a:stretch>
             </a:blipFill>
           </p:spPr>
+          <p:txBody>
+            <a:bodyPr/>
+            <a:lstStyle/>
+            <a:p>
+              <a:endParaRPr lang="en-US"/>
+            </a:p>
+          </p:txBody>
         </p:sp>
       </p:grpSp>
       <p:sp>
@@ -4638,6 +4219,13 @@
             </a:stretch>
           </a:blipFill>
         </p:spPr>
+        <p:txBody>
+          <a:bodyPr/>
+          <a:lstStyle/>
+          <a:p>
+            <a:endParaRPr lang="en-US"/>
+          </a:p>
+        </p:txBody>
       </p:sp>
       <p:sp>
         <p:nvSpPr>
@@ -4821,8 +4409,8 @@
           </a:p>
         </p:txBody>
       </p:sp>
-      <mc:AlternateContent xmlns:mc="http://schemas.openxmlformats.org/markup-compatibility/2006">
-        <mc:Choice xmlns:p14="http://schemas.microsoft.com/office/powerpoint/2010/main" Requires="p14">
+      <mc:AlternateContent xmlns:mc="http://schemas.openxmlformats.org/markup-compatibility/2006" xmlns:p14="http://schemas.microsoft.com/office/powerpoint/2010/main">
+        <mc:Choice Requires="p14">
           <p:contentPart p14:bwMode="auto" r:id="rId7">
             <p14:nvContentPartPr>
               <p14:cNvPr id="12" name="Ink 11">
@@ -4841,7 +4429,7 @@
             </p14:xfrm>
           </p:contentPart>
         </mc:Choice>
-        <mc:Fallback>
+        <mc:Fallback xmlns="">
           <p:pic>
             <p:nvPicPr>
               <p:cNvPr id="12" name="Ink 11">
@@ -4872,8 +4460,8 @@
           </p:pic>
         </mc:Fallback>
       </mc:AlternateContent>
-      <mc:AlternateContent xmlns:mc="http://schemas.openxmlformats.org/markup-compatibility/2006">
-        <mc:Choice xmlns:p14="http://schemas.microsoft.com/office/powerpoint/2010/main" Requires="p14">
+      <mc:AlternateContent xmlns:mc="http://schemas.openxmlformats.org/markup-compatibility/2006" xmlns:p14="http://schemas.microsoft.com/office/powerpoint/2010/main">
+        <mc:Choice Requires="p14">
           <p:contentPart p14:bwMode="auto" r:id="rId9">
             <p14:nvContentPartPr>
               <p14:cNvPr id="13" name="Ink 12">
@@ -4892,7 +4480,7 @@
             </p14:xfrm>
           </p:contentPart>
         </mc:Choice>
-        <mc:Fallback>
+        <mc:Fallback xmlns="">
           <p:pic>
             <p:nvPicPr>
               <p:cNvPr id="13" name="Ink 12">
@@ -5386,6 +4974,13 @@
             </a:stretch>
           </a:blipFill>
         </p:spPr>
+        <p:txBody>
+          <a:bodyPr/>
+          <a:lstStyle/>
+          <a:p>
+            <a:endParaRPr lang="en-US"/>
+          </a:p>
+        </p:txBody>
       </p:sp>
       <p:sp>
         <p:nvSpPr>
@@ -5910,6 +5505,13 @@
             </a:stretch>
           </a:blipFill>
         </p:spPr>
+        <p:txBody>
+          <a:bodyPr/>
+          <a:lstStyle/>
+          <a:p>
+            <a:endParaRPr lang="en-US"/>
+          </a:p>
+        </p:txBody>
       </p:sp>
       <p:sp>
         <p:nvSpPr>

</xml_diff>